<commit_message>
Verbesserungen WRI 05 WRI06
</commit_message>
<xml_diff>
--- a/training-cards/agile moves/Writing (WRI)/ger/apprentice/ger_wri_05_zu_welchem_text_geht_die_energie_AM_A.pptx
+++ b/training-cards/agile moves/Writing (WRI)/ger/apprentice/ger_wri_05_zu_welchem_text_geht_die_energie_AM_A.pptx
@@ -1092,7 +1092,7 @@
                 <a:latin typeface="Avenir Light"/>
                 <a:cs typeface="Avenir Light"/>
               </a:rPr>
-              <a:t>28.10.15</a:t>
+              <a:t>02.11.15</a:t>
             </a:fld>
             <a:endParaRPr lang="de-DE" sz="600" dirty="0">
               <a:solidFill>
@@ -1756,7 +1756,7 @@
                 <a:latin typeface="Avenir Light"/>
                 <a:cs typeface="Avenir Light"/>
               </a:rPr>
-              <a:t>28.10.15</a:t>
+              <a:t>02.11.15</a:t>
             </a:fld>
             <a:endParaRPr lang="de-DE" sz="600" dirty="0">
               <a:solidFill>
@@ -2473,7 +2473,7 @@
                 <a:latin typeface="Avenir Light"/>
                 <a:cs typeface="Avenir Light"/>
               </a:rPr>
-              <a:t>28.10.15</a:t>
+              <a:t>02.11.15</a:t>
             </a:fld>
             <a:endParaRPr lang="de-DE" sz="600" dirty="0">
               <a:solidFill>
@@ -4032,7 +4032,7 @@
           <a:p>
             <a:pPr lvl="0">
               <a:lnSpc>
-                <a:spcPts val="2000"/>
+                <a:spcPts val="1500"/>
               </a:lnSpc>
               <a:spcBef>
                 <a:spcPts val="800"/>
@@ -4066,12 +4066,12 @@
               <a:t>gehe </a:t>
             </a:r>
             <a:r>
-              <a:rPr lang="de-DE" sz="1200" dirty="0" err="1" smtClean="0"/>
-              <a:t>jedesmal</a:t>
-            </a:r>
-            <a:r>
               <a:rPr lang="de-DE" sz="1200" dirty="0" smtClean="0"/>
-              <a:t> für Dich alleine Dein Textideen-</a:t>
+              <a:t>jedes Mal </a:t>
+            </a:r>
+            <a:r>
+              <a:rPr lang="de-DE" sz="1200" dirty="0" smtClean="0"/>
+              <a:t>für Dich alleine Dein Textideen-</a:t>
             </a:r>
             <a:r>
               <a:rPr lang="de-DE" sz="1200" dirty="0" err="1" smtClean="0"/>
@@ -4085,7 +4085,7 @@
           <a:p>
             <a:pPr lvl="0">
               <a:lnSpc>
-                <a:spcPts val="2000"/>
+                <a:spcPts val="1500"/>
               </a:lnSpc>
               <a:spcBef>
                 <a:spcPts val="800"/>
@@ -4095,47 +4095,129 @@
               <a:rPr lang="de-DE" sz="1200" dirty="0" smtClean="0"/>
               <a:t>Sortiere die Einträge dabei so, </a:t>
             </a:r>
+            <a:r>
+              <a:rPr lang="de-DE" sz="1200" dirty="0" smtClean="0"/>
+              <a:t>dass </a:t>
+            </a:r>
+            <a:r>
+              <a:rPr lang="de-DE" sz="1200" dirty="0" smtClean="0"/>
+              <a:t>die </a:t>
+            </a:r>
+            <a:r>
+              <a:rPr lang="de-DE" sz="1200" dirty="0" err="1" smtClean="0"/>
+              <a:t>Textidee</a:t>
+            </a:r>
+            <a:r>
+              <a:rPr lang="de-DE" sz="1200" dirty="0" smtClean="0"/>
+              <a:t>, auf die Du am meisten Lust </a:t>
+            </a:r>
+            <a:r>
+              <a:rPr lang="de-DE" sz="1200" dirty="0" smtClean="0"/>
+              <a:t>hast oder die Du für am interessantesten hältst, </a:t>
+            </a:r>
+            <a:r>
+              <a:rPr lang="de-DE" sz="1200" dirty="0" smtClean="0"/>
+              <a:t>ganz oben steht, </a:t>
+            </a:r>
+            <a:r>
+              <a:rPr lang="de-DE" sz="1200" dirty="0" smtClean="0"/>
+              <a:t>diejenige</a:t>
+            </a:r>
+            <a:r>
+              <a:rPr lang="de-DE" sz="1200" dirty="0" smtClean="0"/>
+              <a:t>, auf Die Du am zweitmeisten Lust </a:t>
+            </a:r>
+            <a:r>
+              <a:rPr lang="de-DE" sz="1200" dirty="0" smtClean="0"/>
+              <a:t>oder an der Du Interesse hast</a:t>
+            </a:r>
+            <a:r>
+              <a:rPr lang="de-DE" sz="1200" dirty="0" smtClean="0"/>
+              <a:t>, auf dem zweiten Platz </a:t>
+            </a:r>
+            <a:r>
+              <a:rPr lang="de-DE" sz="1200" dirty="0" err="1" smtClean="0"/>
+              <a:t>usw.bis</a:t>
+            </a:r>
+            <a:r>
+              <a:rPr lang="de-DE" sz="1200" dirty="0" smtClean="0"/>
+              <a:t> </a:t>
+            </a:r>
+            <a:r>
+              <a:rPr lang="de-DE" sz="1200" dirty="0" smtClean="0"/>
+              <a:t>schließlich die, zu der momentan Deine Energie am wenigsten hingeht</a:t>
+            </a:r>
+            <a:r>
+              <a:rPr lang="de-DE" sz="1200" dirty="0" smtClean="0"/>
+              <a:t>, am </a:t>
+            </a:r>
+            <a:r>
+              <a:rPr lang="de-DE" sz="1200" dirty="0" smtClean="0"/>
+              <a:t>Ende der Liste erscheint</a:t>
+            </a:r>
+            <a:r>
+              <a:rPr lang="de-DE" sz="1200" dirty="0" smtClean="0"/>
+              <a:t>.</a:t>
+            </a:r>
+          </a:p>
+          <a:p>
+            <a:pPr lvl="0">
+              <a:lnSpc>
+                <a:spcPts val="1500"/>
+              </a:lnSpc>
+              <a:spcBef>
+                <a:spcPts val="800"/>
+              </a:spcBef>
+            </a:pPr>
+            <a:r>
+              <a:rPr lang="de-DE" sz="1200" dirty="0"/>
+              <a:t>Wenn Du Dich mit Deinem </a:t>
+            </a:r>
+            <a:r>
+              <a:rPr lang="de-DE" sz="1200" dirty="0" err="1"/>
+              <a:t>Backlog</a:t>
+            </a:r>
+            <a:r>
+              <a:rPr lang="de-DE" sz="1200" dirty="0"/>
+              <a:t> beschäftigst, solltest Du auch alle Ideen, </a:t>
+            </a:r>
+            <a:r>
+              <a:rPr lang="de-DE" sz="1200" dirty="0" smtClean="0"/>
+              <a:t/>
+            </a:r>
             <a:br>
               <a:rPr lang="de-DE" sz="1200" dirty="0" smtClean="0"/>
             </a:br>
             <a:r>
               <a:rPr lang="de-DE" sz="1200" dirty="0" smtClean="0"/>
-              <a:t>dass die </a:t>
-            </a:r>
-            <a:r>
-              <a:rPr lang="de-DE" sz="1200" dirty="0" err="1" smtClean="0"/>
-              <a:t>Textidee</a:t>
+              <a:t>die Dir </a:t>
+            </a:r>
+            <a:r>
+              <a:rPr lang="de-DE" sz="1200" dirty="0"/>
+              <a:t>seit der letzten Backlog-Session eingefallen sind, </a:t>
             </a:r>
             <a:r>
               <a:rPr lang="de-DE" sz="1200" dirty="0" smtClean="0"/>
-              <a:t>, auf die Du am meisten Lust hast, ganz oben steht, </a:t>
-            </a:r>
-            <a:br>
-              <a:rPr lang="de-DE" sz="1200" dirty="0" smtClean="0"/>
-            </a:br>
-            <a:r>
-              <a:rPr lang="de-DE" sz="1200" dirty="0" smtClean="0"/>
-              <a:t>diejenige, auf Die Du am zweitmeisten Lust hast, auf dem zweiten Platz usw.</a:t>
-            </a:r>
-            <a:br>
-              <a:rPr lang="de-DE" sz="1200" dirty="0" smtClean="0"/>
-            </a:br>
-            <a:r>
-              <a:rPr lang="de-DE" sz="1200" dirty="0" smtClean="0"/>
-              <a:t>bis schließlich die, zu der momentan Deine Energie am wenigsten hingeht,</a:t>
-            </a:r>
-            <a:br>
-              <a:rPr lang="de-DE" sz="1200" dirty="0" smtClean="0"/>
-            </a:br>
-            <a:r>
-              <a:rPr lang="de-DE" sz="1200" dirty="0" smtClean="0"/>
-              <a:t>am Ende der Liste erscheint.</a:t>
-            </a:r>
+              <a:t>ergänzen</a:t>
+            </a:r>
+            <a:r>
+              <a:rPr lang="de-DE" sz="1200" dirty="0"/>
+              <a:t>, so dass Du nach der Session immer den aktuellen Stand mit allen Informationen im </a:t>
+            </a:r>
+            <a:r>
+              <a:rPr lang="de-DE" sz="1200" dirty="0" err="1"/>
+              <a:t>Backlog</a:t>
+            </a:r>
+            <a:r>
+              <a:rPr lang="de-DE" sz="1200" dirty="0"/>
+              <a:t> hast.</a:t>
+            </a:r>
+            <a:endParaRPr lang="de-DE" sz="1200" dirty="0" smtClean="0"/>
           </a:p>
           <a:p>
             <a:pPr lvl="0">
               <a:lnSpc>
-                <a:spcPts val="2000"/>
+                <a:spcPts val="1500"/>
               </a:lnSpc>
               <a:spcBef>
                 <a:spcPts val="800"/>

</xml_diff>